<commit_message>
example_01 실습 내용 ppt 추가
</commit_message>
<xml_diff>
--- a/document/webpack.pptx
+++ b/document/webpack.pptx
@@ -18,6 +18,9 @@
     <p:sldId id="266" r:id="rId12"/>
     <p:sldId id="267" r:id="rId13"/>
     <p:sldId id="268" r:id="rId14"/>
+    <p:sldId id="269" r:id="rId15"/>
+    <p:sldId id="270" r:id="rId16"/>
+    <p:sldId id="271" r:id="rId17"/>
   </p:sldIdLst>
   <p:sldSz cx="12192000" cy="6858000"/>
   <p:notesSz cx="6858000" cy="9144000"/>
@@ -271,7 +274,7 @@
           <a:p>
             <a:fld id="{02B78E00-213A-4E88-BF87-34488D6A2990}" type="datetimeFigureOut">
               <a:rPr lang="ko-KR" altLang="en-US" smtClean="0"/>
-              <a:t>2018-12-18</a:t>
+              <a:t>2019-01-07</a:t>
             </a:fld>
             <a:endParaRPr lang="ko-KR" altLang="en-US"/>
           </a:p>
@@ -469,7 +472,7 @@
           <a:p>
             <a:fld id="{02B78E00-213A-4E88-BF87-34488D6A2990}" type="datetimeFigureOut">
               <a:rPr lang="ko-KR" altLang="en-US" smtClean="0"/>
-              <a:t>2018-12-18</a:t>
+              <a:t>2019-01-07</a:t>
             </a:fld>
             <a:endParaRPr lang="ko-KR" altLang="en-US"/>
           </a:p>
@@ -677,7 +680,7 @@
           <a:p>
             <a:fld id="{02B78E00-213A-4E88-BF87-34488D6A2990}" type="datetimeFigureOut">
               <a:rPr lang="ko-KR" altLang="en-US" smtClean="0"/>
-              <a:t>2018-12-18</a:t>
+              <a:t>2019-01-07</a:t>
             </a:fld>
             <a:endParaRPr lang="ko-KR" altLang="en-US"/>
           </a:p>
@@ -903,7 +906,7 @@
           <a:p>
             <a:fld id="{02B78E00-213A-4E88-BF87-34488D6A2990}" type="datetimeFigureOut">
               <a:rPr lang="ko-KR" altLang="en-US" smtClean="0"/>
-              <a:t>2018-12-18</a:t>
+              <a:t>2019-01-07</a:t>
             </a:fld>
             <a:endParaRPr lang="ko-KR" altLang="en-US"/>
           </a:p>
@@ -1178,7 +1181,7 @@
           <a:p>
             <a:fld id="{02B78E00-213A-4E88-BF87-34488D6A2990}" type="datetimeFigureOut">
               <a:rPr lang="ko-KR" altLang="en-US" smtClean="0"/>
-              <a:t>2018-12-18</a:t>
+              <a:t>2019-01-07</a:t>
             </a:fld>
             <a:endParaRPr lang="ko-KR" altLang="en-US"/>
           </a:p>
@@ -1443,7 +1446,7 @@
           <a:p>
             <a:fld id="{02B78E00-213A-4E88-BF87-34488D6A2990}" type="datetimeFigureOut">
               <a:rPr lang="ko-KR" altLang="en-US" smtClean="0"/>
-              <a:t>2018-12-18</a:t>
+              <a:t>2019-01-07</a:t>
             </a:fld>
             <a:endParaRPr lang="ko-KR" altLang="en-US"/>
           </a:p>
@@ -1855,7 +1858,7 @@
           <a:p>
             <a:fld id="{02B78E00-213A-4E88-BF87-34488D6A2990}" type="datetimeFigureOut">
               <a:rPr lang="ko-KR" altLang="en-US" smtClean="0"/>
-              <a:t>2018-12-18</a:t>
+              <a:t>2019-01-07</a:t>
             </a:fld>
             <a:endParaRPr lang="ko-KR" altLang="en-US"/>
           </a:p>
@@ -1996,7 +1999,7 @@
           <a:p>
             <a:fld id="{02B78E00-213A-4E88-BF87-34488D6A2990}" type="datetimeFigureOut">
               <a:rPr lang="ko-KR" altLang="en-US" smtClean="0"/>
-              <a:t>2018-12-18</a:t>
+              <a:t>2019-01-07</a:t>
             </a:fld>
             <a:endParaRPr lang="ko-KR" altLang="en-US"/>
           </a:p>
@@ -2109,7 +2112,7 @@
           <a:p>
             <a:fld id="{02B78E00-213A-4E88-BF87-34488D6A2990}" type="datetimeFigureOut">
               <a:rPr lang="ko-KR" altLang="en-US" smtClean="0"/>
-              <a:t>2018-12-18</a:t>
+              <a:t>2019-01-07</a:t>
             </a:fld>
             <a:endParaRPr lang="ko-KR" altLang="en-US"/>
           </a:p>
@@ -2420,7 +2423,7 @@
           <a:p>
             <a:fld id="{02B78E00-213A-4E88-BF87-34488D6A2990}" type="datetimeFigureOut">
               <a:rPr lang="ko-KR" altLang="en-US" smtClean="0"/>
-              <a:t>2018-12-18</a:t>
+              <a:t>2019-01-07</a:t>
             </a:fld>
             <a:endParaRPr lang="ko-KR" altLang="en-US"/>
           </a:p>
@@ -2708,7 +2711,7 @@
           <a:p>
             <a:fld id="{02B78E00-213A-4E88-BF87-34488D6A2990}" type="datetimeFigureOut">
               <a:rPr lang="ko-KR" altLang="en-US" smtClean="0"/>
-              <a:t>2018-12-18</a:t>
+              <a:t>2019-01-07</a:t>
             </a:fld>
             <a:endParaRPr lang="ko-KR" altLang="en-US"/>
           </a:p>
@@ -2949,7 +2952,7 @@
           <a:p>
             <a:fld id="{02B78E00-213A-4E88-BF87-34488D6A2990}" type="datetimeFigureOut">
               <a:rPr lang="ko-KR" altLang="en-US" smtClean="0"/>
-              <a:t>2018-12-18</a:t>
+              <a:t>2019-01-07</a:t>
             </a:fld>
             <a:endParaRPr lang="ko-KR" altLang="en-US"/>
           </a:p>
@@ -4169,6 +4172,511 @@
     <p:extLst>
       <p:ext uri="{BB962C8B-B14F-4D97-AF65-F5344CB8AC3E}">
         <p14:creationId xmlns:p14="http://schemas.microsoft.com/office/powerpoint/2010/main" val="2511514058"/>
+      </p:ext>
+    </p:extLst>
+  </p:cSld>
+  <p:clrMapOvr>
+    <a:masterClrMapping/>
+  </p:clrMapOvr>
+</p:sld>
+</file>
+
+<file path=ppt/slides/slide14.xml><?xml version="1.0" encoding="utf-8"?>
+<p:sld xmlns:a="http://schemas.openxmlformats.org/drawingml/2006/main" xmlns:r="http://schemas.openxmlformats.org/officeDocument/2006/relationships" xmlns:p="http://schemas.openxmlformats.org/presentationml/2006/main">
+  <p:cSld>
+    <p:spTree>
+      <p:nvGrpSpPr>
+        <p:cNvPr id="1" name=""/>
+        <p:cNvGrpSpPr/>
+        <p:nvPr/>
+      </p:nvGrpSpPr>
+      <p:grpSpPr>
+        <a:xfrm>
+          <a:off x="0" y="0"/>
+          <a:ext cx="0" cy="0"/>
+          <a:chOff x="0" y="0"/>
+          <a:chExt cx="0" cy="0"/>
+        </a:xfrm>
+      </p:grpSpPr>
+      <p:sp>
+        <p:nvSpPr>
+          <p:cNvPr id="2" name="제목 1">
+            <a:extLst>
+              <a:ext uri="{FF2B5EF4-FFF2-40B4-BE49-F238E27FC236}">
+                <a16:creationId xmlns:a16="http://schemas.microsoft.com/office/drawing/2014/main" id="{3E01F859-C05C-48E7-ACFE-2BB214FC1CE2}"/>
+              </a:ext>
+            </a:extLst>
+          </p:cNvPr>
+          <p:cNvSpPr>
+            <a:spLocks noGrp="1"/>
+          </p:cNvSpPr>
+          <p:nvPr>
+            <p:ph type="title"/>
+          </p:nvPr>
+        </p:nvSpPr>
+        <p:spPr/>
+        <p:txBody>
+          <a:bodyPr/>
+          <a:lstStyle/>
+          <a:p>
+            <a:r>
+              <a:rPr lang="en-US" altLang="ko-KR" dirty="0"/>
+              <a:t>8-2) Babel</a:t>
+            </a:r>
+            <a:r>
+              <a:rPr lang="ko-KR" altLang="en-US" dirty="0"/>
+              <a:t> </a:t>
+            </a:r>
+            <a:r>
+              <a:rPr lang="en-US" altLang="ko-KR" dirty="0"/>
+              <a:t>Loader</a:t>
+            </a:r>
+            <a:r>
+              <a:rPr lang="ko-KR" altLang="en-US" dirty="0"/>
+              <a:t> </a:t>
+            </a:r>
+            <a:r>
+              <a:rPr lang="en-US" altLang="ko-KR" dirty="0"/>
+              <a:t>–</a:t>
+            </a:r>
+            <a:r>
+              <a:rPr lang="ko-KR" altLang="en-US" dirty="0"/>
+              <a:t> </a:t>
+            </a:r>
+            <a:r>
+              <a:rPr lang="en-US" altLang="ko-KR" dirty="0"/>
+              <a:t>ES</a:t>
+            </a:r>
+            <a:r>
+              <a:rPr lang="ko-KR" altLang="en-US" dirty="0"/>
+              <a:t> </a:t>
+            </a:r>
+            <a:r>
+              <a:rPr lang="en-US" altLang="ko-KR" dirty="0"/>
+              <a:t>6</a:t>
+            </a:r>
+            <a:endParaRPr lang="ko-KR" altLang="en-US" dirty="0"/>
+          </a:p>
+        </p:txBody>
+      </p:sp>
+      <p:sp>
+        <p:nvSpPr>
+          <p:cNvPr id="3" name="내용 개체 틀 2">
+            <a:extLst>
+              <a:ext uri="{FF2B5EF4-FFF2-40B4-BE49-F238E27FC236}">
+                <a16:creationId xmlns:a16="http://schemas.microsoft.com/office/drawing/2014/main" id="{A8019115-C98D-45B0-B0B3-DF3391186FB6}"/>
+              </a:ext>
+            </a:extLst>
+          </p:cNvPr>
+          <p:cNvSpPr>
+            <a:spLocks noGrp="1"/>
+          </p:cNvSpPr>
+          <p:nvPr>
+            <p:ph idx="1"/>
+          </p:nvPr>
+        </p:nvSpPr>
+        <p:spPr/>
+        <p:txBody>
+          <a:bodyPr/>
+          <a:lstStyle/>
+          <a:p>
+            <a:r>
+              <a:rPr lang="en-US" altLang="ko-KR" dirty="0"/>
+              <a:t>preset : Babel </a:t>
+            </a:r>
+            <a:r>
+              <a:rPr lang="ko-KR" altLang="en-US" dirty="0"/>
+              <a:t>플러그인 리스트</a:t>
+            </a:r>
+          </a:p>
+        </p:txBody>
+      </p:sp>
+      <p:pic>
+        <p:nvPicPr>
+          <p:cNvPr id="5" name="그림 4">
+            <a:extLst>
+              <a:ext uri="{FF2B5EF4-FFF2-40B4-BE49-F238E27FC236}">
+                <a16:creationId xmlns:a16="http://schemas.microsoft.com/office/drawing/2014/main" id="{E507ED1B-A105-407F-A52D-26040F4E4139}"/>
+              </a:ext>
+            </a:extLst>
+          </p:cNvPr>
+          <p:cNvPicPr>
+            <a:picLocks noChangeAspect="1"/>
+          </p:cNvPicPr>
+          <p:nvPr/>
+        </p:nvPicPr>
+        <p:blipFill>
+          <a:blip r:embed="rId2">
+            <a:clrChange>
+              <a:clrFrom>
+                <a:srgbClr val="F7F5F7"/>
+              </a:clrFrom>
+              <a:clrTo>
+                <a:srgbClr val="F7F5F7">
+                  <a:alpha val="0"/>
+                </a:srgbClr>
+              </a:clrTo>
+            </a:clrChange>
+            <a:extLst>
+              <a:ext uri="{28A0092B-C50C-407E-A947-70E740481C1C}">
+                <a14:useLocalDpi xmlns:a14="http://schemas.microsoft.com/office/drawing/2010/main" val="0"/>
+              </a:ext>
+            </a:extLst>
+          </a:blip>
+          <a:stretch>
+            <a:fillRect/>
+          </a:stretch>
+        </p:blipFill>
+        <p:spPr>
+          <a:xfrm>
+            <a:off x="274034" y="1426103"/>
+            <a:ext cx="8221222" cy="4429743"/>
+          </a:xfrm>
+          <a:prstGeom prst="rect">
+            <a:avLst/>
+          </a:prstGeom>
+        </p:spPr>
+      </p:pic>
+    </p:spTree>
+    <p:extLst>
+      <p:ext uri="{BB962C8B-B14F-4D97-AF65-F5344CB8AC3E}">
+        <p14:creationId xmlns:p14="http://schemas.microsoft.com/office/powerpoint/2010/main" val="956198177"/>
+      </p:ext>
+    </p:extLst>
+  </p:cSld>
+  <p:clrMapOvr>
+    <a:masterClrMapping/>
+  </p:clrMapOvr>
+</p:sld>
+</file>
+
+<file path=ppt/slides/slide15.xml><?xml version="1.0" encoding="utf-8"?>
+<p:sld xmlns:a="http://schemas.openxmlformats.org/drawingml/2006/main" xmlns:r="http://schemas.openxmlformats.org/officeDocument/2006/relationships" xmlns:p="http://schemas.openxmlformats.org/presentationml/2006/main">
+  <p:cSld>
+    <p:spTree>
+      <p:nvGrpSpPr>
+        <p:cNvPr id="1" name=""/>
+        <p:cNvGrpSpPr/>
+        <p:nvPr/>
+      </p:nvGrpSpPr>
+      <p:grpSpPr>
+        <a:xfrm>
+          <a:off x="0" y="0"/>
+          <a:ext cx="0" cy="0"/>
+          <a:chOff x="0" y="0"/>
+          <a:chExt cx="0" cy="0"/>
+        </a:xfrm>
+      </p:grpSpPr>
+      <p:sp>
+        <p:nvSpPr>
+          <p:cNvPr id="2" name="제목 1">
+            <a:extLst>
+              <a:ext uri="{FF2B5EF4-FFF2-40B4-BE49-F238E27FC236}">
+                <a16:creationId xmlns:a16="http://schemas.microsoft.com/office/drawing/2014/main" id="{D3B9E0AD-2DAE-4C7F-8241-023C44AB4CCC}"/>
+              </a:ext>
+            </a:extLst>
+          </p:cNvPr>
+          <p:cNvSpPr>
+            <a:spLocks noGrp="1"/>
+          </p:cNvSpPr>
+          <p:nvPr>
+            <p:ph type="title"/>
+          </p:nvPr>
+        </p:nvSpPr>
+        <p:spPr/>
+        <p:txBody>
+          <a:bodyPr/>
+          <a:lstStyle/>
+          <a:p>
+            <a:r>
+              <a:rPr lang="en-US" altLang="ko-KR" dirty="0"/>
+              <a:t>8-3) Loader</a:t>
+            </a:r>
+            <a:r>
+              <a:rPr lang="ko-KR" altLang="en-US" dirty="0"/>
+              <a:t> 실습 </a:t>
+            </a:r>
+            <a:r>
+              <a:rPr lang="en-US" altLang="ko-KR" dirty="0"/>
+              <a:t>1</a:t>
+            </a:r>
+            <a:endParaRPr lang="ko-KR" altLang="en-US" dirty="0"/>
+          </a:p>
+        </p:txBody>
+      </p:sp>
+      <p:sp>
+        <p:nvSpPr>
+          <p:cNvPr id="3" name="내용 개체 틀 2">
+            <a:extLst>
+              <a:ext uri="{FF2B5EF4-FFF2-40B4-BE49-F238E27FC236}">
+                <a16:creationId xmlns:a16="http://schemas.microsoft.com/office/drawing/2014/main" id="{1B23C822-EF52-499E-9736-416C2D95BAC7}"/>
+              </a:ext>
+            </a:extLst>
+          </p:cNvPr>
+          <p:cNvSpPr>
+            <a:spLocks noGrp="1"/>
+          </p:cNvSpPr>
+          <p:nvPr>
+            <p:ph idx="1"/>
+          </p:nvPr>
+        </p:nvSpPr>
+        <p:spPr/>
+        <p:txBody>
+          <a:bodyPr/>
+          <a:lstStyle/>
+          <a:p>
+            <a:r>
+              <a:rPr lang="en-US" altLang="ko-KR" dirty="0"/>
+              <a:t>CSS Code Splitting 1 – Bundling libraries</a:t>
+            </a:r>
+          </a:p>
+          <a:p>
+            <a:r>
+              <a:rPr lang="ko-KR" altLang="en-US" dirty="0"/>
+              <a:t>실습 절차</a:t>
+            </a:r>
+            <a:endParaRPr lang="en-US" altLang="ko-KR" dirty="0"/>
+          </a:p>
+          <a:p>
+            <a:pPr lvl="1"/>
+            <a:r>
+              <a:rPr lang="en-US" altLang="ko-KR" dirty="0" err="1"/>
+              <a:t>npm</a:t>
+            </a:r>
+            <a:r>
+              <a:rPr lang="en-US" altLang="ko-KR" dirty="0"/>
+              <a:t> </a:t>
+            </a:r>
+            <a:r>
+              <a:rPr lang="en-US" altLang="ko-KR" dirty="0" err="1"/>
+              <a:t>init</a:t>
+            </a:r>
+            <a:r>
+              <a:rPr lang="en-US" altLang="ko-KR" dirty="0"/>
+              <a:t> –y </a:t>
+            </a:r>
+            <a:r>
+              <a:rPr lang="ko-KR" altLang="en-US" dirty="0"/>
+              <a:t>으로 </a:t>
+            </a:r>
+            <a:r>
+              <a:rPr lang="en-US" altLang="ko-KR" dirty="0" err="1"/>
+              <a:t>package.json</a:t>
+            </a:r>
+            <a:r>
+              <a:rPr lang="en-US" altLang="ko-KR" dirty="0"/>
+              <a:t> </a:t>
+            </a:r>
+            <a:r>
+              <a:rPr lang="ko-KR" altLang="en-US" dirty="0"/>
+              <a:t>생성</a:t>
+            </a:r>
+            <a:endParaRPr lang="en-US" altLang="ko-KR" dirty="0"/>
+          </a:p>
+          <a:p>
+            <a:pPr lvl="1"/>
+            <a:r>
+              <a:rPr lang="en-US" altLang="ko-KR" dirty="0" err="1"/>
+              <a:t>npm</a:t>
+            </a:r>
+            <a:r>
+              <a:rPr lang="en-US" altLang="ko-KR" dirty="0"/>
+              <a:t> </a:t>
+            </a:r>
+            <a:r>
+              <a:rPr lang="ko-KR" altLang="en-US" dirty="0"/>
+              <a:t>명령어로 </a:t>
+            </a:r>
+            <a:r>
+              <a:rPr lang="en-US" altLang="ko-KR" dirty="0"/>
+              <a:t>loader, plugin </a:t>
+            </a:r>
+            <a:r>
+              <a:rPr lang="ko-KR" altLang="en-US" dirty="0"/>
+              <a:t>설치</a:t>
+            </a:r>
+            <a:endParaRPr lang="en-US" altLang="ko-KR" dirty="0"/>
+          </a:p>
+          <a:p>
+            <a:pPr lvl="1"/>
+            <a:r>
+              <a:rPr lang="en-US" altLang="ko-KR" dirty="0"/>
+              <a:t>index.html, app/index.js, base.css </a:t>
+            </a:r>
+            <a:r>
+              <a:rPr lang="ko-KR" altLang="en-US" dirty="0"/>
+              <a:t>생성</a:t>
+            </a:r>
+            <a:endParaRPr lang="en-US" altLang="ko-KR" dirty="0"/>
+          </a:p>
+          <a:p>
+            <a:pPr lvl="1"/>
+            <a:r>
+              <a:rPr lang="en-US" altLang="ko-KR" dirty="0"/>
+              <a:t>webpack.config.js </a:t>
+            </a:r>
+            <a:r>
+              <a:rPr lang="ko-KR" altLang="en-US" dirty="0"/>
+              <a:t>설정</a:t>
+            </a:r>
+            <a:endParaRPr lang="en-US" altLang="ko-KR" dirty="0"/>
+          </a:p>
+          <a:p>
+            <a:pPr lvl="1"/>
+            <a:r>
+              <a:rPr lang="en-US" altLang="ko-KR" dirty="0"/>
+              <a:t>webpack </a:t>
+            </a:r>
+            <a:r>
+              <a:rPr lang="ko-KR" altLang="en-US" dirty="0"/>
+              <a:t>실행</a:t>
+            </a:r>
+            <a:endParaRPr lang="en-US" altLang="ko-KR" dirty="0"/>
+          </a:p>
+          <a:p>
+            <a:r>
+              <a:rPr lang="ko-KR" altLang="en-US" dirty="0"/>
+              <a:t>결과 </a:t>
+            </a:r>
+            <a:r>
+              <a:rPr lang="en-US" altLang="ko-KR" dirty="0"/>
+              <a:t>:</a:t>
+            </a:r>
+          </a:p>
+          <a:p>
+            <a:pPr lvl="1"/>
+            <a:r>
+              <a:rPr lang="en-US" altLang="ko-KR" dirty="0"/>
+              <a:t>style &gt; p </a:t>
+            </a:r>
+            <a:r>
+              <a:rPr lang="ko-KR" altLang="en-US" dirty="0"/>
+              <a:t>태그 </a:t>
+            </a:r>
+            <a:r>
+              <a:rPr lang="en-US" altLang="ko-KR" dirty="0"/>
+              <a:t>&gt; blue</a:t>
+            </a:r>
+          </a:p>
+          <a:p>
+            <a:r>
+              <a:rPr lang="ko-KR" altLang="en-US" dirty="0"/>
+              <a:t>경로 </a:t>
+            </a:r>
+            <a:r>
+              <a:rPr lang="en-US" altLang="ko-KR" dirty="0"/>
+              <a:t>: /lecture/02_example_01/</a:t>
+            </a:r>
+            <a:endParaRPr lang="ko-KR" altLang="en-US" dirty="0"/>
+          </a:p>
+        </p:txBody>
+      </p:sp>
+    </p:spTree>
+    <p:extLst>
+      <p:ext uri="{BB962C8B-B14F-4D97-AF65-F5344CB8AC3E}">
+        <p14:creationId xmlns:p14="http://schemas.microsoft.com/office/powerpoint/2010/main" val="1989837910"/>
+      </p:ext>
+    </p:extLst>
+  </p:cSld>
+  <p:clrMapOvr>
+    <a:masterClrMapping/>
+  </p:clrMapOvr>
+</p:sld>
+</file>
+
+<file path=ppt/slides/slide16.xml><?xml version="1.0" encoding="utf-8"?>
+<p:sld xmlns:a="http://schemas.openxmlformats.org/drawingml/2006/main" xmlns:r="http://schemas.openxmlformats.org/officeDocument/2006/relationships" xmlns:p="http://schemas.openxmlformats.org/presentationml/2006/main">
+  <p:cSld>
+    <p:spTree>
+      <p:nvGrpSpPr>
+        <p:cNvPr id="1" name=""/>
+        <p:cNvGrpSpPr/>
+        <p:nvPr/>
+      </p:nvGrpSpPr>
+      <p:grpSpPr>
+        <a:xfrm>
+          <a:off x="0" y="0"/>
+          <a:ext cx="0" cy="0"/>
+          <a:chOff x="0" y="0"/>
+          <a:chExt cx="0" cy="0"/>
+        </a:xfrm>
+      </p:grpSpPr>
+      <p:sp>
+        <p:nvSpPr>
+          <p:cNvPr id="2" name="제목 1">
+            <a:extLst>
+              <a:ext uri="{FF2B5EF4-FFF2-40B4-BE49-F238E27FC236}">
+                <a16:creationId xmlns:a16="http://schemas.microsoft.com/office/drawing/2014/main" id="{54D1A78B-2BDF-4CE4-B9E3-1DF6D560F513}"/>
+              </a:ext>
+            </a:extLst>
+          </p:cNvPr>
+          <p:cNvSpPr>
+            <a:spLocks noGrp="1"/>
+          </p:cNvSpPr>
+          <p:nvPr>
+            <p:ph type="title"/>
+          </p:nvPr>
+        </p:nvSpPr>
+        <p:spPr/>
+        <p:txBody>
+          <a:bodyPr/>
+          <a:lstStyle/>
+          <a:p>
+            <a:r>
+              <a:rPr lang="en-US" altLang="ko-KR" dirty="0"/>
+              <a:t>8-4) Loader </a:t>
+            </a:r>
+            <a:r>
+              <a:rPr lang="ko-KR" altLang="en-US" dirty="0"/>
+              <a:t>실습 </a:t>
+            </a:r>
+            <a:r>
+              <a:rPr lang="en-US" altLang="ko-KR" dirty="0"/>
+              <a:t>2</a:t>
+            </a:r>
+            <a:endParaRPr lang="ko-KR" altLang="en-US" dirty="0"/>
+          </a:p>
+        </p:txBody>
+      </p:sp>
+      <p:sp>
+        <p:nvSpPr>
+          <p:cNvPr id="3" name="내용 개체 틀 2">
+            <a:extLst>
+              <a:ext uri="{FF2B5EF4-FFF2-40B4-BE49-F238E27FC236}">
+                <a16:creationId xmlns:a16="http://schemas.microsoft.com/office/drawing/2014/main" id="{8310C18B-678D-4E57-A2F5-C4A79A0A5381}"/>
+              </a:ext>
+            </a:extLst>
+          </p:cNvPr>
+          <p:cNvSpPr>
+            <a:spLocks noGrp="1"/>
+          </p:cNvSpPr>
+          <p:nvPr>
+            <p:ph idx="1"/>
+          </p:nvPr>
+        </p:nvSpPr>
+        <p:spPr/>
+        <p:txBody>
+          <a:bodyPr/>
+          <a:lstStyle/>
+          <a:p>
+            <a:r>
+              <a:rPr lang="en-US" altLang="ko-KR" dirty="0"/>
+              <a:t>CSS Code Splitting 2 – Extract </a:t>
+            </a:r>
+            <a:r>
+              <a:rPr lang="en-US" altLang="ko-KR"/>
+              <a:t>Text Plugin</a:t>
+            </a:r>
+          </a:p>
+          <a:p>
+            <a:endParaRPr lang="ko-KR" altLang="en-US"/>
+          </a:p>
+        </p:txBody>
+      </p:sp>
+    </p:spTree>
+    <p:extLst>
+      <p:ext uri="{BB962C8B-B14F-4D97-AF65-F5344CB8AC3E}">
+        <p14:creationId xmlns:p14="http://schemas.microsoft.com/office/powerpoint/2010/main" val="2384821384"/>
       </p:ext>
     </p:extLst>
   </p:cSld>

</xml_diff>

<commit_message>
example_02 실습 내용 추가 pptx
</commit_message>
<xml_diff>
--- a/document/webpack.pptx
+++ b/document/webpack.pptx
@@ -4559,6 +4559,42 @@
             </a:r>
           </a:p>
           <a:p>
+            <a:pPr lvl="1"/>
+            <a:r>
+              <a:rPr lang="en-US" altLang="ko-KR" dirty="0"/>
+              <a:t>* HTML head</a:t>
+            </a:r>
+            <a:r>
+              <a:rPr lang="ko-KR" altLang="en-US" dirty="0"/>
+              <a:t>에 </a:t>
+            </a:r>
+            <a:r>
+              <a:rPr lang="en-US" altLang="ko-KR" dirty="0"/>
+              <a:t>style</a:t>
+            </a:r>
+            <a:r>
+              <a:rPr lang="ko-KR" altLang="en-US" dirty="0"/>
+              <a:t>가 생성되고</a:t>
+            </a:r>
+            <a:r>
+              <a:rPr lang="en-US" altLang="ko-KR" dirty="0"/>
+              <a:t>, </a:t>
+            </a:r>
+            <a:r>
+              <a:rPr lang="en-US" altLang="ko-KR" dirty="0" err="1"/>
+              <a:t>css</a:t>
+            </a:r>
+            <a:r>
+              <a:rPr lang="ko-KR" altLang="en-US" dirty="0"/>
+              <a:t>문이 그대로 </a:t>
+            </a:r>
+            <a:r>
+              <a:rPr lang="ko-KR" altLang="en-US" dirty="0" err="1"/>
+              <a:t>들어감</a:t>
+            </a:r>
+            <a:endParaRPr lang="en-US" altLang="ko-KR" dirty="0"/>
+          </a:p>
+          <a:p>
             <a:r>
               <a:rPr lang="ko-KR" altLang="en-US" dirty="0"/>
               <a:t>경로 </a:t>
@@ -4661,15 +4697,42 @@
           <a:p>
             <a:r>
               <a:rPr lang="en-US" altLang="ko-KR" dirty="0"/>
-              <a:t>CSS Code Splitting 2 – Extract </a:t>
+              <a:t>CSS Code Splitting 2 – Extract Text Plugin</a:t>
+            </a:r>
+          </a:p>
+          <a:p>
+            <a:r>
+              <a:rPr lang="en-US" altLang="ko-KR" dirty="0"/>
+              <a:t>Extract Text Plugin</a:t>
+            </a:r>
+            <a:r>
+              <a:rPr lang="ko-KR" altLang="en-US" dirty="0"/>
+              <a:t>을 사용하면 </a:t>
+            </a:r>
+            <a:r>
+              <a:rPr lang="en-US" altLang="ko-KR" dirty="0"/>
+              <a:t>.</a:t>
+            </a:r>
+            <a:r>
+              <a:rPr lang="en-US" altLang="ko-KR" dirty="0" err="1"/>
+              <a:t>css</a:t>
+            </a:r>
+            <a:r>
+              <a:rPr lang="ko-KR" altLang="en-US" dirty="0"/>
+              <a:t>를 파일로 분리할 수 있음</a:t>
+            </a:r>
+            <a:endParaRPr lang="en-US" altLang="ko-KR" dirty="0"/>
+          </a:p>
+          <a:p>
+            <a:r>
+              <a:rPr lang="ko-KR" altLang="en-US" dirty="0"/>
+              <a:t>경로 </a:t>
             </a:r>
             <a:r>
               <a:rPr lang="en-US" altLang="ko-KR"/>
-              <a:t>Text Plugin</a:t>
-            </a:r>
-          </a:p>
-          <a:p>
-            <a:endParaRPr lang="ko-KR" altLang="en-US"/>
+              <a:t>: /lecture/03_example_02/</a:t>
+            </a:r>
+            <a:endParaRPr lang="ko-KR" altLang="en-US" dirty="0"/>
           </a:p>
         </p:txBody>
       </p:sp>

</xml_diff>

<commit_message>
webpack plugins, resolve 문서 추가
</commit_message>
<xml_diff>
--- a/document/webpack.pptx
+++ b/document/webpack.pptx
@@ -21,6 +21,10 @@
     <p:sldId id="269" r:id="rId15"/>
     <p:sldId id="270" r:id="rId16"/>
     <p:sldId id="271" r:id="rId17"/>
+    <p:sldId id="272" r:id="rId18"/>
+    <p:sldId id="273" r:id="rId19"/>
+    <p:sldId id="274" r:id="rId20"/>
+    <p:sldId id="275" r:id="rId21"/>
   </p:sldIdLst>
   <p:sldSz cx="12192000" cy="6858000"/>
   <p:notesSz cx="6858000" cy="9144000"/>
@@ -274,7 +278,7 @@
           <a:p>
             <a:fld id="{02B78E00-213A-4E88-BF87-34488D6A2990}" type="datetimeFigureOut">
               <a:rPr lang="ko-KR" altLang="en-US" smtClean="0"/>
-              <a:t>2019-01-07</a:t>
+              <a:t>2019-01-13</a:t>
             </a:fld>
             <a:endParaRPr lang="ko-KR" altLang="en-US"/>
           </a:p>
@@ -472,7 +476,7 @@
           <a:p>
             <a:fld id="{02B78E00-213A-4E88-BF87-34488D6A2990}" type="datetimeFigureOut">
               <a:rPr lang="ko-KR" altLang="en-US" smtClean="0"/>
-              <a:t>2019-01-07</a:t>
+              <a:t>2019-01-13</a:t>
             </a:fld>
             <a:endParaRPr lang="ko-KR" altLang="en-US"/>
           </a:p>
@@ -680,7 +684,7 @@
           <a:p>
             <a:fld id="{02B78E00-213A-4E88-BF87-34488D6A2990}" type="datetimeFigureOut">
               <a:rPr lang="ko-KR" altLang="en-US" smtClean="0"/>
-              <a:t>2019-01-07</a:t>
+              <a:t>2019-01-13</a:t>
             </a:fld>
             <a:endParaRPr lang="ko-KR" altLang="en-US"/>
           </a:p>
@@ -906,7 +910,7 @@
           <a:p>
             <a:fld id="{02B78E00-213A-4E88-BF87-34488D6A2990}" type="datetimeFigureOut">
               <a:rPr lang="ko-KR" altLang="en-US" smtClean="0"/>
-              <a:t>2019-01-07</a:t>
+              <a:t>2019-01-13</a:t>
             </a:fld>
             <a:endParaRPr lang="ko-KR" altLang="en-US"/>
           </a:p>
@@ -1181,7 +1185,7 @@
           <a:p>
             <a:fld id="{02B78E00-213A-4E88-BF87-34488D6A2990}" type="datetimeFigureOut">
               <a:rPr lang="ko-KR" altLang="en-US" smtClean="0"/>
-              <a:t>2019-01-07</a:t>
+              <a:t>2019-01-13</a:t>
             </a:fld>
             <a:endParaRPr lang="ko-KR" altLang="en-US"/>
           </a:p>
@@ -1446,7 +1450,7 @@
           <a:p>
             <a:fld id="{02B78E00-213A-4E88-BF87-34488D6A2990}" type="datetimeFigureOut">
               <a:rPr lang="ko-KR" altLang="en-US" smtClean="0"/>
-              <a:t>2019-01-07</a:t>
+              <a:t>2019-01-13</a:t>
             </a:fld>
             <a:endParaRPr lang="ko-KR" altLang="en-US"/>
           </a:p>
@@ -1858,7 +1862,7 @@
           <a:p>
             <a:fld id="{02B78E00-213A-4E88-BF87-34488D6A2990}" type="datetimeFigureOut">
               <a:rPr lang="ko-KR" altLang="en-US" smtClean="0"/>
-              <a:t>2019-01-07</a:t>
+              <a:t>2019-01-13</a:t>
             </a:fld>
             <a:endParaRPr lang="ko-KR" altLang="en-US"/>
           </a:p>
@@ -1999,7 +2003,7 @@
           <a:p>
             <a:fld id="{02B78E00-213A-4E88-BF87-34488D6A2990}" type="datetimeFigureOut">
               <a:rPr lang="ko-KR" altLang="en-US" smtClean="0"/>
-              <a:t>2019-01-07</a:t>
+              <a:t>2019-01-13</a:t>
             </a:fld>
             <a:endParaRPr lang="ko-KR" altLang="en-US"/>
           </a:p>
@@ -2112,7 +2116,7 @@
           <a:p>
             <a:fld id="{02B78E00-213A-4E88-BF87-34488D6A2990}" type="datetimeFigureOut">
               <a:rPr lang="ko-KR" altLang="en-US" smtClean="0"/>
-              <a:t>2019-01-07</a:t>
+              <a:t>2019-01-13</a:t>
             </a:fld>
             <a:endParaRPr lang="ko-KR" altLang="en-US"/>
           </a:p>
@@ -2423,7 +2427,7 @@
           <a:p>
             <a:fld id="{02B78E00-213A-4E88-BF87-34488D6A2990}" type="datetimeFigureOut">
               <a:rPr lang="ko-KR" altLang="en-US" smtClean="0"/>
-              <a:t>2019-01-07</a:t>
+              <a:t>2019-01-13</a:t>
             </a:fld>
             <a:endParaRPr lang="ko-KR" altLang="en-US"/>
           </a:p>
@@ -2711,7 +2715,7 @@
           <a:p>
             <a:fld id="{02B78E00-213A-4E88-BF87-34488D6A2990}" type="datetimeFigureOut">
               <a:rPr lang="ko-KR" altLang="en-US" smtClean="0"/>
-              <a:t>2019-01-07</a:t>
+              <a:t>2019-01-13</a:t>
             </a:fld>
             <a:endParaRPr lang="ko-KR" altLang="en-US"/>
           </a:p>
@@ -2952,7 +2956,7 @@
           <a:p>
             <a:fld id="{02B78E00-213A-4E88-BF87-34488D6A2990}" type="datetimeFigureOut">
               <a:rPr lang="ko-KR" altLang="en-US" smtClean="0"/>
-              <a:t>2019-01-07</a:t>
+              <a:t>2019-01-13</a:t>
             </a:fld>
             <a:endParaRPr lang="ko-KR" altLang="en-US"/>
           </a:p>
@@ -4729,7 +4733,7 @@
               <a:t>경로 </a:t>
             </a:r>
             <a:r>
-              <a:rPr lang="en-US" altLang="ko-KR"/>
+              <a:rPr lang="en-US" altLang="ko-KR" dirty="0"/>
               <a:t>: /lecture/03_example_02/</a:t>
             </a:r>
             <a:endParaRPr lang="ko-KR" altLang="en-US" dirty="0"/>
@@ -4740,6 +4744,1206 @@
     <p:extLst>
       <p:ext uri="{BB962C8B-B14F-4D97-AF65-F5344CB8AC3E}">
         <p14:creationId xmlns:p14="http://schemas.microsoft.com/office/powerpoint/2010/main" val="2384821384"/>
+      </p:ext>
+    </p:extLst>
+  </p:cSld>
+  <p:clrMapOvr>
+    <a:masterClrMapping/>
+  </p:clrMapOvr>
+</p:sld>
+</file>
+
+<file path=ppt/slides/slide17.xml><?xml version="1.0" encoding="utf-8"?>
+<p:sld xmlns:a="http://schemas.openxmlformats.org/drawingml/2006/main" xmlns:r="http://schemas.openxmlformats.org/officeDocument/2006/relationships" xmlns:p="http://schemas.openxmlformats.org/presentationml/2006/main">
+  <p:cSld>
+    <p:spTree>
+      <p:nvGrpSpPr>
+        <p:cNvPr id="1" name=""/>
+        <p:cNvGrpSpPr/>
+        <p:nvPr/>
+      </p:nvGrpSpPr>
+      <p:grpSpPr>
+        <a:xfrm>
+          <a:off x="0" y="0"/>
+          <a:ext cx="0" cy="0"/>
+          <a:chOff x="0" y="0"/>
+          <a:chExt cx="0" cy="0"/>
+        </a:xfrm>
+      </p:grpSpPr>
+      <p:sp>
+        <p:nvSpPr>
+          <p:cNvPr id="2" name="제목 1">
+            <a:extLst>
+              <a:ext uri="{FF2B5EF4-FFF2-40B4-BE49-F238E27FC236}">
+                <a16:creationId xmlns:a16="http://schemas.microsoft.com/office/drawing/2014/main" id="{ACA04B5D-6761-48FE-AF2F-80AFF4D45C8D}"/>
+              </a:ext>
+            </a:extLst>
+          </p:cNvPr>
+          <p:cNvSpPr>
+            <a:spLocks noGrp="1"/>
+          </p:cNvSpPr>
+          <p:nvPr>
+            <p:ph type="title"/>
+          </p:nvPr>
+        </p:nvSpPr>
+        <p:spPr/>
+        <p:txBody>
+          <a:bodyPr/>
+          <a:lstStyle/>
+          <a:p>
+            <a:r>
+              <a:rPr lang="en-US" altLang="ko-KR" dirty="0"/>
+              <a:t>9-1) Webpack Plugins</a:t>
+            </a:r>
+            <a:endParaRPr lang="ko-KR" altLang="en-US" dirty="0"/>
+          </a:p>
+        </p:txBody>
+      </p:sp>
+      <p:sp>
+        <p:nvSpPr>
+          <p:cNvPr id="3" name="내용 개체 틀 2">
+            <a:extLst>
+              <a:ext uri="{FF2B5EF4-FFF2-40B4-BE49-F238E27FC236}">
+                <a16:creationId xmlns:a16="http://schemas.microsoft.com/office/drawing/2014/main" id="{0EF0B658-AF39-4507-81C4-F66D2354236F}"/>
+              </a:ext>
+            </a:extLst>
+          </p:cNvPr>
+          <p:cNvSpPr>
+            <a:spLocks noGrp="1"/>
+          </p:cNvSpPr>
+          <p:nvPr>
+            <p:ph idx="1"/>
+          </p:nvPr>
+        </p:nvSpPr>
+        <p:spPr>
+          <a:xfrm>
+            <a:off x="148243" y="1047405"/>
+            <a:ext cx="11888584" cy="689116"/>
+          </a:xfrm>
+        </p:spPr>
+        <p:txBody>
+          <a:bodyPr/>
+          <a:lstStyle/>
+          <a:p>
+            <a:r>
+              <a:rPr lang="ko-KR" altLang="en-US" dirty="0"/>
+              <a:t>플러그인은 </a:t>
+            </a:r>
+            <a:r>
+              <a:rPr lang="ko-KR" altLang="en-US" dirty="0" err="1"/>
+              <a:t>파일별</a:t>
+            </a:r>
+            <a:r>
+              <a:rPr lang="ko-KR" altLang="en-US" dirty="0"/>
+              <a:t> 커스텀 기능을 사용하기 위해서 사용한다</a:t>
+            </a:r>
+            <a:r>
+              <a:rPr lang="en-US" altLang="ko-KR" dirty="0"/>
+              <a:t>.</a:t>
+            </a:r>
+          </a:p>
+          <a:p>
+            <a:pPr lvl="1"/>
+            <a:r>
+              <a:rPr lang="en-US" altLang="ko-KR" dirty="0"/>
+              <a:t>Ex) JS minification, file extraction, alias(</a:t>
+            </a:r>
+            <a:r>
+              <a:rPr lang="ko-KR" altLang="en-US" dirty="0"/>
+              <a:t>별칭</a:t>
+            </a:r>
+            <a:r>
+              <a:rPr lang="en-US" altLang="ko-KR" dirty="0"/>
+              <a:t>)</a:t>
+            </a:r>
+            <a:endParaRPr lang="ko-KR" altLang="en-US" dirty="0"/>
+          </a:p>
+        </p:txBody>
+      </p:sp>
+      <p:pic>
+        <p:nvPicPr>
+          <p:cNvPr id="5" name="그림 4">
+            <a:extLst>
+              <a:ext uri="{FF2B5EF4-FFF2-40B4-BE49-F238E27FC236}">
+                <a16:creationId xmlns:a16="http://schemas.microsoft.com/office/drawing/2014/main" id="{E89285CF-279B-4AC8-A824-005FC0AA7764}"/>
+              </a:ext>
+            </a:extLst>
+          </p:cNvPr>
+          <p:cNvPicPr>
+            <a:picLocks noChangeAspect="1"/>
+          </p:cNvPicPr>
+          <p:nvPr/>
+        </p:nvPicPr>
+        <p:blipFill>
+          <a:blip r:embed="rId2">
+            <a:clrChange>
+              <a:clrFrom>
+                <a:srgbClr val="F7F5F7"/>
+              </a:clrFrom>
+              <a:clrTo>
+                <a:srgbClr val="F7F5F7">
+                  <a:alpha val="0"/>
+                </a:srgbClr>
+              </a:clrTo>
+            </a:clrChange>
+            <a:extLst>
+              <a:ext uri="{28A0092B-C50C-407E-A947-70E740481C1C}">
+                <a14:useLocalDpi xmlns:a14="http://schemas.microsoft.com/office/drawing/2010/main" val="0"/>
+              </a:ext>
+            </a:extLst>
+          </a:blip>
+          <a:stretch>
+            <a:fillRect/>
+          </a:stretch>
+        </p:blipFill>
+        <p:spPr>
+          <a:xfrm>
+            <a:off x="155173" y="1736521"/>
+            <a:ext cx="7354326" cy="3124636"/>
+          </a:xfrm>
+          <a:prstGeom prst="rect">
+            <a:avLst/>
+          </a:prstGeom>
+        </p:spPr>
+      </p:pic>
+      <p:sp>
+        <p:nvSpPr>
+          <p:cNvPr id="6" name="내용 개체 틀 2">
+            <a:extLst>
+              <a:ext uri="{FF2B5EF4-FFF2-40B4-BE49-F238E27FC236}">
+                <a16:creationId xmlns:a16="http://schemas.microsoft.com/office/drawing/2014/main" id="{64EE9774-E204-494E-97D5-EA6D98049B5E}"/>
+              </a:ext>
+            </a:extLst>
+          </p:cNvPr>
+          <p:cNvSpPr txBox="1">
+            <a:spLocks/>
+          </p:cNvSpPr>
+          <p:nvPr/>
+        </p:nvSpPr>
+        <p:spPr>
+          <a:xfrm>
+            <a:off x="155173" y="5025185"/>
+            <a:ext cx="11888584" cy="689116"/>
+          </a:xfrm>
+          <a:prstGeom prst="rect">
+            <a:avLst/>
+          </a:prstGeom>
+        </p:spPr>
+        <p:txBody>
+          <a:bodyPr vert="horz" lIns="91440" tIns="45720" rIns="91440" bIns="45720" rtlCol="0">
+            <a:normAutofit/>
+          </a:bodyPr>
+          <a:lstStyle>
+            <a:lvl1pPr marL="342900" indent="-342900" algn="l" defTabSz="914400" rtl="0" eaLnBrk="1" latinLnBrk="1" hangingPunct="1">
+              <a:lnSpc>
+                <a:spcPct val="90000"/>
+              </a:lnSpc>
+              <a:spcBef>
+                <a:spcPts val="1000"/>
+              </a:spcBef>
+              <a:buFont typeface="+mj-lt"/>
+              <a:buAutoNum type="arabicPeriod"/>
+              <a:defRPr sz="1600" kern="1200">
+                <a:solidFill>
+                  <a:schemeClr val="tx1"/>
+                </a:solidFill>
+                <a:latin typeface="+mn-lt"/>
+                <a:ea typeface="+mn-ea"/>
+                <a:cs typeface="+mn-cs"/>
+              </a:defRPr>
+            </a:lvl1pPr>
+            <a:lvl2pPr marL="800100" indent="-342900" algn="l" defTabSz="914400" rtl="0" eaLnBrk="1" latinLnBrk="1" hangingPunct="1">
+              <a:lnSpc>
+                <a:spcPct val="90000"/>
+              </a:lnSpc>
+              <a:spcBef>
+                <a:spcPts val="500"/>
+              </a:spcBef>
+              <a:buFont typeface="Arial" panose="020B0604020202020204" pitchFamily="34" charset="0"/>
+              <a:buChar char="•"/>
+              <a:defRPr sz="1600" kern="1200">
+                <a:solidFill>
+                  <a:schemeClr val="tx1"/>
+                </a:solidFill>
+                <a:latin typeface="+mn-lt"/>
+                <a:ea typeface="+mn-ea"/>
+                <a:cs typeface="+mn-cs"/>
+              </a:defRPr>
+            </a:lvl2pPr>
+            <a:lvl3pPr marL="1257300" indent="-342900" algn="l" defTabSz="914400" rtl="0" eaLnBrk="1" latinLnBrk="1" hangingPunct="1">
+              <a:lnSpc>
+                <a:spcPct val="90000"/>
+              </a:lnSpc>
+              <a:spcBef>
+                <a:spcPts val="500"/>
+              </a:spcBef>
+              <a:buFont typeface="Wingdings" panose="05000000000000000000" pitchFamily="2" charset="2"/>
+              <a:buChar char="§"/>
+              <a:defRPr sz="1600" kern="1200">
+                <a:solidFill>
+                  <a:schemeClr val="tx1"/>
+                </a:solidFill>
+                <a:latin typeface="+mn-lt"/>
+                <a:ea typeface="+mn-ea"/>
+                <a:cs typeface="+mn-cs"/>
+              </a:defRPr>
+            </a:lvl3pPr>
+            <a:lvl4pPr marL="1714500" indent="-342900" algn="l" defTabSz="914400" rtl="0" eaLnBrk="1" latinLnBrk="1" hangingPunct="1">
+              <a:lnSpc>
+                <a:spcPct val="90000"/>
+              </a:lnSpc>
+              <a:spcBef>
+                <a:spcPts val="500"/>
+              </a:spcBef>
+              <a:buFont typeface="Wingdings" panose="05000000000000000000" pitchFamily="2" charset="2"/>
+              <a:buChar char="ü"/>
+              <a:defRPr sz="1600" kern="1200">
+                <a:solidFill>
+                  <a:schemeClr val="tx1"/>
+                </a:solidFill>
+                <a:latin typeface="+mn-lt"/>
+                <a:ea typeface="+mn-ea"/>
+                <a:cs typeface="+mn-cs"/>
+              </a:defRPr>
+            </a:lvl4pPr>
+            <a:lvl5pPr marL="2171700" indent="-342900" algn="l" defTabSz="914400" rtl="0" eaLnBrk="1" latinLnBrk="1" hangingPunct="1">
+              <a:lnSpc>
+                <a:spcPct val="90000"/>
+              </a:lnSpc>
+              <a:spcBef>
+                <a:spcPts val="500"/>
+              </a:spcBef>
+              <a:buFont typeface="Wingdings" panose="05000000000000000000" pitchFamily="2" charset="2"/>
+              <a:buChar char="Ø"/>
+              <a:defRPr sz="1600" kern="1200">
+                <a:solidFill>
+                  <a:schemeClr val="tx1"/>
+                </a:solidFill>
+                <a:latin typeface="+mn-lt"/>
+                <a:ea typeface="+mn-ea"/>
+                <a:cs typeface="+mn-cs"/>
+              </a:defRPr>
+            </a:lvl5pPr>
+            <a:lvl6pPr marL="2514600" indent="-228600" algn="l" defTabSz="914400" rtl="0" eaLnBrk="1" latinLnBrk="1" hangingPunct="1">
+              <a:lnSpc>
+                <a:spcPct val="90000"/>
+              </a:lnSpc>
+              <a:spcBef>
+                <a:spcPts val="500"/>
+              </a:spcBef>
+              <a:buFont typeface="Arial" panose="020B0604020202020204" pitchFamily="34" charset="0"/>
+              <a:buChar char="•"/>
+              <a:defRPr sz="1800" kern="1200">
+                <a:solidFill>
+                  <a:schemeClr val="tx1"/>
+                </a:solidFill>
+                <a:latin typeface="+mn-lt"/>
+                <a:ea typeface="+mn-ea"/>
+                <a:cs typeface="+mn-cs"/>
+              </a:defRPr>
+            </a:lvl6pPr>
+            <a:lvl7pPr marL="2971800" indent="-228600" algn="l" defTabSz="914400" rtl="0" eaLnBrk="1" latinLnBrk="1" hangingPunct="1">
+              <a:lnSpc>
+                <a:spcPct val="90000"/>
+              </a:lnSpc>
+              <a:spcBef>
+                <a:spcPts val="500"/>
+              </a:spcBef>
+              <a:buFont typeface="Arial" panose="020B0604020202020204" pitchFamily="34" charset="0"/>
+              <a:buChar char="•"/>
+              <a:defRPr sz="1800" kern="1200">
+                <a:solidFill>
+                  <a:schemeClr val="tx1"/>
+                </a:solidFill>
+                <a:latin typeface="+mn-lt"/>
+                <a:ea typeface="+mn-ea"/>
+                <a:cs typeface="+mn-cs"/>
+              </a:defRPr>
+            </a:lvl7pPr>
+            <a:lvl8pPr marL="3429000" indent="-228600" algn="l" defTabSz="914400" rtl="0" eaLnBrk="1" latinLnBrk="1" hangingPunct="1">
+              <a:lnSpc>
+                <a:spcPct val="90000"/>
+              </a:lnSpc>
+              <a:spcBef>
+                <a:spcPts val="500"/>
+              </a:spcBef>
+              <a:buFont typeface="Arial" panose="020B0604020202020204" pitchFamily="34" charset="0"/>
+              <a:buChar char="•"/>
+              <a:defRPr sz="1800" kern="1200">
+                <a:solidFill>
+                  <a:schemeClr val="tx1"/>
+                </a:solidFill>
+                <a:latin typeface="+mn-lt"/>
+                <a:ea typeface="+mn-ea"/>
+                <a:cs typeface="+mn-cs"/>
+              </a:defRPr>
+            </a:lvl8pPr>
+            <a:lvl9pPr marL="3886200" indent="-228600" algn="l" defTabSz="914400" rtl="0" eaLnBrk="1" latinLnBrk="1" hangingPunct="1">
+              <a:lnSpc>
+                <a:spcPct val="90000"/>
+              </a:lnSpc>
+              <a:spcBef>
+                <a:spcPts val="500"/>
+              </a:spcBef>
+              <a:buFont typeface="Arial" panose="020B0604020202020204" pitchFamily="34" charset="0"/>
+              <a:buChar char="•"/>
+              <a:defRPr sz="1800" kern="1200">
+                <a:solidFill>
+                  <a:schemeClr val="tx1"/>
+                </a:solidFill>
+                <a:latin typeface="+mn-lt"/>
+                <a:ea typeface="+mn-ea"/>
+                <a:cs typeface="+mn-cs"/>
+              </a:defRPr>
+            </a:lvl9pPr>
+          </a:lstStyle>
+          <a:p>
+            <a:endParaRPr lang="ko-KR" altLang="en-US" dirty="0"/>
+          </a:p>
+        </p:txBody>
+      </p:sp>
+    </p:spTree>
+    <p:extLst>
+      <p:ext uri="{BB962C8B-B14F-4D97-AF65-F5344CB8AC3E}">
+        <p14:creationId xmlns:p14="http://schemas.microsoft.com/office/powerpoint/2010/main" val="2591707438"/>
+      </p:ext>
+    </p:extLst>
+  </p:cSld>
+  <p:clrMapOvr>
+    <a:masterClrMapping/>
+  </p:clrMapOvr>
+</p:sld>
+</file>
+
+<file path=ppt/slides/slide18.xml><?xml version="1.0" encoding="utf-8"?>
+<p:sld xmlns:a="http://schemas.openxmlformats.org/drawingml/2006/main" xmlns:r="http://schemas.openxmlformats.org/officeDocument/2006/relationships" xmlns:p="http://schemas.openxmlformats.org/presentationml/2006/main">
+  <p:cSld>
+    <p:spTree>
+      <p:nvGrpSpPr>
+        <p:cNvPr id="1" name=""/>
+        <p:cNvGrpSpPr/>
+        <p:nvPr/>
+      </p:nvGrpSpPr>
+      <p:grpSpPr>
+        <a:xfrm>
+          <a:off x="0" y="0"/>
+          <a:ext cx="0" cy="0"/>
+          <a:chOff x="0" y="0"/>
+          <a:chExt cx="0" cy="0"/>
+        </a:xfrm>
+      </p:grpSpPr>
+      <p:sp>
+        <p:nvSpPr>
+          <p:cNvPr id="2" name="제목 1">
+            <a:extLst>
+              <a:ext uri="{FF2B5EF4-FFF2-40B4-BE49-F238E27FC236}">
+                <a16:creationId xmlns:a16="http://schemas.microsoft.com/office/drawing/2014/main" id="{867ABBC7-A5A2-4384-BB83-57E09CF298B4}"/>
+              </a:ext>
+            </a:extLst>
+          </p:cNvPr>
+          <p:cNvSpPr>
+            <a:spLocks noGrp="1"/>
+          </p:cNvSpPr>
+          <p:nvPr>
+            <p:ph type="title"/>
+          </p:nvPr>
+        </p:nvSpPr>
+        <p:spPr/>
+        <p:txBody>
+          <a:bodyPr/>
+          <a:lstStyle/>
+          <a:p>
+            <a:r>
+              <a:rPr lang="en-US" altLang="ko-KR" dirty="0"/>
+              <a:t>9-2) Plugin </a:t>
+            </a:r>
+            <a:r>
+              <a:rPr lang="ko-KR" altLang="en-US" dirty="0"/>
+              <a:t>종류</a:t>
+            </a:r>
+          </a:p>
+        </p:txBody>
+      </p:sp>
+      <p:sp>
+        <p:nvSpPr>
+          <p:cNvPr id="3" name="내용 개체 틀 2">
+            <a:extLst>
+              <a:ext uri="{FF2B5EF4-FFF2-40B4-BE49-F238E27FC236}">
+                <a16:creationId xmlns:a16="http://schemas.microsoft.com/office/drawing/2014/main" id="{BE86F329-B085-408A-B9F7-1B87E9253BAA}"/>
+              </a:ext>
+            </a:extLst>
+          </p:cNvPr>
+          <p:cNvSpPr>
+            <a:spLocks noGrp="1"/>
+          </p:cNvSpPr>
+          <p:nvPr>
+            <p:ph idx="1"/>
+          </p:nvPr>
+        </p:nvSpPr>
+        <p:spPr/>
+        <p:txBody>
+          <a:bodyPr/>
+          <a:lstStyle/>
+          <a:p>
+            <a:r>
+              <a:rPr lang="en-US" altLang="ko-KR" dirty="0" err="1"/>
+              <a:t>ProvidePlugins</a:t>
+            </a:r>
+            <a:endParaRPr lang="en-US" altLang="ko-KR" dirty="0"/>
+          </a:p>
+          <a:p>
+            <a:pPr lvl="1"/>
+            <a:r>
+              <a:rPr lang="ko-KR" altLang="en-US" dirty="0"/>
+              <a:t>모든 모듈에서 사용할 수 있도록 해당 모듈을 변수로 변환한다</a:t>
+            </a:r>
+            <a:r>
+              <a:rPr lang="en-US" altLang="ko-KR" dirty="0"/>
+              <a:t>.</a:t>
+            </a:r>
+          </a:p>
+          <a:p>
+            <a:pPr marL="457200" lvl="1" indent="0">
+              <a:buNone/>
+            </a:pPr>
+            <a:r>
+              <a:rPr lang="en-US" altLang="ko-KR" dirty="0"/>
+              <a:t>	new </a:t>
+            </a:r>
+            <a:r>
+              <a:rPr lang="en-US" altLang="ko-KR" dirty="0" err="1"/>
+              <a:t>webpack.ProvidePlugin</a:t>
+            </a:r>
+            <a:r>
+              <a:rPr lang="en-US" altLang="ko-KR" dirty="0"/>
+              <a:t>({</a:t>
+            </a:r>
+          </a:p>
+          <a:p>
+            <a:pPr marL="457200" lvl="1" indent="0">
+              <a:buNone/>
+            </a:pPr>
+            <a:r>
+              <a:rPr lang="en-US" altLang="ko-KR" dirty="0"/>
+              <a:t>		$: ‘</a:t>
+            </a:r>
+            <a:r>
+              <a:rPr lang="en-US" altLang="ko-KR" dirty="0" err="1"/>
+              <a:t>jquery</a:t>
+            </a:r>
+            <a:r>
+              <a:rPr lang="en-US" altLang="ko-KR" dirty="0"/>
+              <a:t>’</a:t>
+            </a:r>
+          </a:p>
+          <a:p>
+            <a:pPr marL="457200" lvl="1" indent="0">
+              <a:buNone/>
+            </a:pPr>
+            <a:r>
+              <a:rPr lang="en-US" altLang="ko-KR" dirty="0"/>
+              <a:t>	});</a:t>
+            </a:r>
+          </a:p>
+          <a:p>
+            <a:r>
+              <a:rPr lang="en-US" altLang="ko-KR" dirty="0" err="1"/>
+              <a:t>DefinePlugins</a:t>
+            </a:r>
+            <a:endParaRPr lang="en-US" altLang="ko-KR" dirty="0"/>
+          </a:p>
+          <a:p>
+            <a:pPr lvl="1"/>
+            <a:r>
+              <a:rPr lang="en-US" altLang="ko-KR" dirty="0"/>
+              <a:t>Webpack </a:t>
+            </a:r>
+            <a:r>
+              <a:rPr lang="ko-KR" altLang="en-US" dirty="0" err="1"/>
+              <a:t>번들링을</a:t>
+            </a:r>
+            <a:r>
+              <a:rPr lang="ko-KR" altLang="en-US" dirty="0"/>
+              <a:t> 시작하는 시점에 사용 가능한 상수들을 정의한다</a:t>
+            </a:r>
+            <a:r>
+              <a:rPr lang="en-US" altLang="ko-KR" dirty="0"/>
+              <a:t>.</a:t>
+            </a:r>
+          </a:p>
+          <a:p>
+            <a:pPr lvl="1"/>
+            <a:r>
+              <a:rPr lang="ko-KR" altLang="en-US" dirty="0"/>
+              <a:t>일반적으로 </a:t>
+            </a:r>
+            <a:r>
+              <a:rPr lang="ko-KR" altLang="en-US" dirty="0" err="1"/>
+              <a:t>개발계</a:t>
+            </a:r>
+            <a:r>
+              <a:rPr lang="ko-KR" altLang="en-US" dirty="0"/>
+              <a:t> </a:t>
+            </a:r>
+            <a:r>
+              <a:rPr lang="en-US" altLang="ko-KR" dirty="0"/>
+              <a:t>&amp; </a:t>
+            </a:r>
+            <a:r>
+              <a:rPr lang="ko-KR" altLang="en-US" dirty="0"/>
+              <a:t>테스트계에 따라 다른 설정을 적용할 때 유용하다</a:t>
+            </a:r>
+            <a:r>
+              <a:rPr lang="en-US" altLang="ko-KR" dirty="0"/>
+              <a:t>.</a:t>
+            </a:r>
+          </a:p>
+          <a:p>
+            <a:r>
+              <a:rPr lang="en-US" altLang="ko-KR" dirty="0" err="1"/>
+              <a:t>ManifestPlugin</a:t>
+            </a:r>
+            <a:endParaRPr lang="en-US" altLang="ko-KR" dirty="0"/>
+          </a:p>
+          <a:p>
+            <a:pPr lvl="1"/>
+            <a:r>
+              <a:rPr lang="ko-KR" altLang="en-US" dirty="0" err="1"/>
+              <a:t>번들링시</a:t>
+            </a:r>
+            <a:r>
+              <a:rPr lang="ko-KR" altLang="en-US" dirty="0"/>
+              <a:t> 생성되는 코드</a:t>
+            </a:r>
+            <a:r>
+              <a:rPr lang="en-US" altLang="ko-KR" dirty="0"/>
+              <a:t> (</a:t>
+            </a:r>
+            <a:r>
+              <a:rPr lang="ko-KR" altLang="en-US" dirty="0"/>
+              <a:t>라이브러리</a:t>
+            </a:r>
+            <a:r>
+              <a:rPr lang="en-US" altLang="ko-KR" dirty="0"/>
+              <a:t>)</a:t>
+            </a:r>
+            <a:r>
+              <a:rPr lang="ko-KR" altLang="en-US" dirty="0"/>
+              <a:t>에 대한 정보를 </a:t>
+            </a:r>
+            <a:r>
+              <a:rPr lang="en-US" altLang="ko-KR" dirty="0"/>
+              <a:t>json </a:t>
+            </a:r>
+            <a:r>
+              <a:rPr lang="ko-KR" altLang="en-US" dirty="0"/>
+              <a:t>파일로 저장하여 관리</a:t>
+            </a:r>
+            <a:endParaRPr lang="en-US" altLang="ko-KR" dirty="0"/>
+          </a:p>
+        </p:txBody>
+      </p:sp>
+    </p:spTree>
+    <p:extLst>
+      <p:ext uri="{BB962C8B-B14F-4D97-AF65-F5344CB8AC3E}">
+        <p14:creationId xmlns:p14="http://schemas.microsoft.com/office/powerpoint/2010/main" val="723558561"/>
+      </p:ext>
+    </p:extLst>
+  </p:cSld>
+  <p:clrMapOvr>
+    <a:masterClrMapping/>
+  </p:clrMapOvr>
+</p:sld>
+</file>
+
+<file path=ppt/slides/slide19.xml><?xml version="1.0" encoding="utf-8"?>
+<p:sld xmlns:a="http://schemas.openxmlformats.org/drawingml/2006/main" xmlns:r="http://schemas.openxmlformats.org/officeDocument/2006/relationships" xmlns:p="http://schemas.openxmlformats.org/presentationml/2006/main">
+  <p:cSld>
+    <p:spTree>
+      <p:nvGrpSpPr>
+        <p:cNvPr id="1" name=""/>
+        <p:cNvGrpSpPr/>
+        <p:nvPr/>
+      </p:nvGrpSpPr>
+      <p:grpSpPr>
+        <a:xfrm>
+          <a:off x="0" y="0"/>
+          <a:ext cx="0" cy="0"/>
+          <a:chOff x="0" y="0"/>
+          <a:chExt cx="0" cy="0"/>
+        </a:xfrm>
+      </p:grpSpPr>
+      <p:sp>
+        <p:nvSpPr>
+          <p:cNvPr id="2" name="제목 1">
+            <a:extLst>
+              <a:ext uri="{FF2B5EF4-FFF2-40B4-BE49-F238E27FC236}">
+                <a16:creationId xmlns:a16="http://schemas.microsoft.com/office/drawing/2014/main" id="{2D7E4892-D059-4115-9864-9D822B7D099B}"/>
+              </a:ext>
+            </a:extLst>
+          </p:cNvPr>
+          <p:cNvSpPr>
+            <a:spLocks noGrp="1"/>
+          </p:cNvSpPr>
+          <p:nvPr>
+            <p:ph type="title"/>
+          </p:nvPr>
+        </p:nvSpPr>
+        <p:spPr/>
+        <p:txBody>
+          <a:bodyPr/>
+          <a:lstStyle/>
+          <a:p>
+            <a:r>
+              <a:rPr lang="en-US" altLang="ko-KR" dirty="0"/>
+              <a:t>10-1) Webpack Resolve</a:t>
+            </a:r>
+            <a:endParaRPr lang="ko-KR" altLang="en-US" dirty="0"/>
+          </a:p>
+        </p:txBody>
+      </p:sp>
+      <p:sp>
+        <p:nvSpPr>
+          <p:cNvPr id="3" name="내용 개체 틀 2">
+            <a:extLst>
+              <a:ext uri="{FF2B5EF4-FFF2-40B4-BE49-F238E27FC236}">
+                <a16:creationId xmlns:a16="http://schemas.microsoft.com/office/drawing/2014/main" id="{03B1B040-3888-4470-A070-92BD5C8D2446}"/>
+              </a:ext>
+            </a:extLst>
+          </p:cNvPr>
+          <p:cNvSpPr>
+            <a:spLocks noGrp="1"/>
+          </p:cNvSpPr>
+          <p:nvPr>
+            <p:ph idx="1"/>
+          </p:nvPr>
+        </p:nvSpPr>
+        <p:spPr>
+          <a:xfrm>
+            <a:off x="148243" y="1047405"/>
+            <a:ext cx="11888584" cy="944357"/>
+          </a:xfrm>
+        </p:spPr>
+        <p:txBody>
+          <a:bodyPr/>
+          <a:lstStyle/>
+          <a:p>
+            <a:r>
+              <a:rPr lang="en-US" altLang="ko-KR" dirty="0"/>
+              <a:t>Webpack</a:t>
+            </a:r>
+            <a:r>
+              <a:rPr lang="ko-KR" altLang="en-US" dirty="0"/>
+              <a:t>의 모듈 </a:t>
+            </a:r>
+            <a:r>
+              <a:rPr lang="ko-KR" altLang="en-US" dirty="0" err="1"/>
+              <a:t>번들링</a:t>
+            </a:r>
+            <a:r>
+              <a:rPr lang="ko-KR" altLang="en-US" dirty="0"/>
+              <a:t> 관점에서 봤을 때</a:t>
+            </a:r>
+            <a:r>
+              <a:rPr lang="en-US" altLang="ko-KR" dirty="0"/>
+              <a:t>, </a:t>
+            </a:r>
+            <a:r>
+              <a:rPr lang="ko-KR" altLang="en-US" dirty="0" err="1"/>
+              <a:t>모듈간의</a:t>
+            </a:r>
+            <a:r>
+              <a:rPr lang="ko-KR" altLang="en-US" dirty="0"/>
+              <a:t> 의존성을 고려하여 모듈을 로딩해야 한다</a:t>
+            </a:r>
+            <a:r>
+              <a:rPr lang="en-US" altLang="ko-KR" dirty="0"/>
+              <a:t>.</a:t>
+            </a:r>
+          </a:p>
+          <a:p>
+            <a:r>
+              <a:rPr lang="ko-KR" altLang="en-US" dirty="0"/>
+              <a:t>따라서</a:t>
+            </a:r>
+            <a:r>
+              <a:rPr lang="en-US" altLang="ko-KR" dirty="0"/>
+              <a:t>, </a:t>
+            </a:r>
+            <a:r>
+              <a:rPr lang="ko-KR" altLang="en-US" dirty="0"/>
+              <a:t>모듈을 어떤 위치에서 어떻게 </a:t>
+            </a:r>
+            <a:r>
+              <a:rPr lang="ko-KR" altLang="en-US" dirty="0" err="1"/>
+              <a:t>로딩할지에</a:t>
+            </a:r>
+            <a:r>
+              <a:rPr lang="ko-KR" altLang="en-US" dirty="0"/>
+              <a:t> 관해 정의를 하는 것이 바로 </a:t>
+            </a:r>
+            <a:r>
+              <a:rPr lang="en-US" altLang="ko-KR" dirty="0"/>
+              <a:t>Module Resolution</a:t>
+            </a:r>
+          </a:p>
+        </p:txBody>
+      </p:sp>
+      <p:sp>
+        <p:nvSpPr>
+          <p:cNvPr id="4" name="내용 개체 틀 2">
+            <a:extLst>
+              <a:ext uri="{FF2B5EF4-FFF2-40B4-BE49-F238E27FC236}">
+                <a16:creationId xmlns:a16="http://schemas.microsoft.com/office/drawing/2014/main" id="{11F0FF5A-38D3-439E-8558-49FF03E90F68}"/>
+              </a:ext>
+            </a:extLst>
+          </p:cNvPr>
+          <p:cNvSpPr txBox="1">
+            <a:spLocks/>
+          </p:cNvSpPr>
+          <p:nvPr/>
+        </p:nvSpPr>
+        <p:spPr>
+          <a:xfrm>
+            <a:off x="148243" y="2157249"/>
+            <a:ext cx="11888584" cy="4564226"/>
+          </a:xfrm>
+          <a:prstGeom prst="rect">
+            <a:avLst/>
+          </a:prstGeom>
+        </p:spPr>
+        <p:txBody>
+          <a:bodyPr vert="horz" lIns="91440" tIns="45720" rIns="91440" bIns="45720" rtlCol="0">
+            <a:normAutofit/>
+          </a:bodyPr>
+          <a:lstStyle>
+            <a:lvl1pPr marL="342900" indent="-342900" algn="l" defTabSz="914400" rtl="0" eaLnBrk="1" latinLnBrk="1" hangingPunct="1">
+              <a:lnSpc>
+                <a:spcPct val="90000"/>
+              </a:lnSpc>
+              <a:spcBef>
+                <a:spcPts val="1000"/>
+              </a:spcBef>
+              <a:buFont typeface="+mj-lt"/>
+              <a:buAutoNum type="arabicPeriod"/>
+              <a:defRPr sz="1600" kern="1200">
+                <a:solidFill>
+                  <a:schemeClr val="tx1"/>
+                </a:solidFill>
+                <a:latin typeface="+mn-lt"/>
+                <a:ea typeface="+mn-ea"/>
+                <a:cs typeface="+mn-cs"/>
+              </a:defRPr>
+            </a:lvl1pPr>
+            <a:lvl2pPr marL="800100" indent="-342900" algn="l" defTabSz="914400" rtl="0" eaLnBrk="1" latinLnBrk="1" hangingPunct="1">
+              <a:lnSpc>
+                <a:spcPct val="90000"/>
+              </a:lnSpc>
+              <a:spcBef>
+                <a:spcPts val="500"/>
+              </a:spcBef>
+              <a:buFont typeface="Arial" panose="020B0604020202020204" pitchFamily="34" charset="0"/>
+              <a:buChar char="•"/>
+              <a:defRPr sz="1600" kern="1200">
+                <a:solidFill>
+                  <a:schemeClr val="tx1"/>
+                </a:solidFill>
+                <a:latin typeface="+mn-lt"/>
+                <a:ea typeface="+mn-ea"/>
+                <a:cs typeface="+mn-cs"/>
+              </a:defRPr>
+            </a:lvl2pPr>
+            <a:lvl3pPr marL="1257300" indent="-342900" algn="l" defTabSz="914400" rtl="0" eaLnBrk="1" latinLnBrk="1" hangingPunct="1">
+              <a:lnSpc>
+                <a:spcPct val="90000"/>
+              </a:lnSpc>
+              <a:spcBef>
+                <a:spcPts val="500"/>
+              </a:spcBef>
+              <a:buFont typeface="Wingdings" panose="05000000000000000000" pitchFamily="2" charset="2"/>
+              <a:buChar char="§"/>
+              <a:defRPr sz="1600" kern="1200">
+                <a:solidFill>
+                  <a:schemeClr val="tx1"/>
+                </a:solidFill>
+                <a:latin typeface="+mn-lt"/>
+                <a:ea typeface="+mn-ea"/>
+                <a:cs typeface="+mn-cs"/>
+              </a:defRPr>
+            </a:lvl3pPr>
+            <a:lvl4pPr marL="1714500" indent="-342900" algn="l" defTabSz="914400" rtl="0" eaLnBrk="1" latinLnBrk="1" hangingPunct="1">
+              <a:lnSpc>
+                <a:spcPct val="90000"/>
+              </a:lnSpc>
+              <a:spcBef>
+                <a:spcPts val="500"/>
+              </a:spcBef>
+              <a:buFont typeface="Wingdings" panose="05000000000000000000" pitchFamily="2" charset="2"/>
+              <a:buChar char="ü"/>
+              <a:defRPr sz="1600" kern="1200">
+                <a:solidFill>
+                  <a:schemeClr val="tx1"/>
+                </a:solidFill>
+                <a:latin typeface="+mn-lt"/>
+                <a:ea typeface="+mn-ea"/>
+                <a:cs typeface="+mn-cs"/>
+              </a:defRPr>
+            </a:lvl4pPr>
+            <a:lvl5pPr marL="2171700" indent="-342900" algn="l" defTabSz="914400" rtl="0" eaLnBrk="1" latinLnBrk="1" hangingPunct="1">
+              <a:lnSpc>
+                <a:spcPct val="90000"/>
+              </a:lnSpc>
+              <a:spcBef>
+                <a:spcPts val="500"/>
+              </a:spcBef>
+              <a:buFont typeface="Wingdings" panose="05000000000000000000" pitchFamily="2" charset="2"/>
+              <a:buChar char="Ø"/>
+              <a:defRPr sz="1600" kern="1200">
+                <a:solidFill>
+                  <a:schemeClr val="tx1"/>
+                </a:solidFill>
+                <a:latin typeface="+mn-lt"/>
+                <a:ea typeface="+mn-ea"/>
+                <a:cs typeface="+mn-cs"/>
+              </a:defRPr>
+            </a:lvl5pPr>
+            <a:lvl6pPr marL="2514600" indent="-228600" algn="l" defTabSz="914400" rtl="0" eaLnBrk="1" latinLnBrk="1" hangingPunct="1">
+              <a:lnSpc>
+                <a:spcPct val="90000"/>
+              </a:lnSpc>
+              <a:spcBef>
+                <a:spcPts val="500"/>
+              </a:spcBef>
+              <a:buFont typeface="Arial" panose="020B0604020202020204" pitchFamily="34" charset="0"/>
+              <a:buChar char="•"/>
+              <a:defRPr sz="1800" kern="1200">
+                <a:solidFill>
+                  <a:schemeClr val="tx1"/>
+                </a:solidFill>
+                <a:latin typeface="+mn-lt"/>
+                <a:ea typeface="+mn-ea"/>
+                <a:cs typeface="+mn-cs"/>
+              </a:defRPr>
+            </a:lvl6pPr>
+            <a:lvl7pPr marL="2971800" indent="-228600" algn="l" defTabSz="914400" rtl="0" eaLnBrk="1" latinLnBrk="1" hangingPunct="1">
+              <a:lnSpc>
+                <a:spcPct val="90000"/>
+              </a:lnSpc>
+              <a:spcBef>
+                <a:spcPts val="500"/>
+              </a:spcBef>
+              <a:buFont typeface="Arial" panose="020B0604020202020204" pitchFamily="34" charset="0"/>
+              <a:buChar char="•"/>
+              <a:defRPr sz="1800" kern="1200">
+                <a:solidFill>
+                  <a:schemeClr val="tx1"/>
+                </a:solidFill>
+                <a:latin typeface="+mn-lt"/>
+                <a:ea typeface="+mn-ea"/>
+                <a:cs typeface="+mn-cs"/>
+              </a:defRPr>
+            </a:lvl7pPr>
+            <a:lvl8pPr marL="3429000" indent="-228600" algn="l" defTabSz="914400" rtl="0" eaLnBrk="1" latinLnBrk="1" hangingPunct="1">
+              <a:lnSpc>
+                <a:spcPct val="90000"/>
+              </a:lnSpc>
+              <a:spcBef>
+                <a:spcPts val="500"/>
+              </a:spcBef>
+              <a:buFont typeface="Arial" panose="020B0604020202020204" pitchFamily="34" charset="0"/>
+              <a:buChar char="•"/>
+              <a:defRPr sz="1800" kern="1200">
+                <a:solidFill>
+                  <a:schemeClr val="tx1"/>
+                </a:solidFill>
+                <a:latin typeface="+mn-lt"/>
+                <a:ea typeface="+mn-ea"/>
+                <a:cs typeface="+mn-cs"/>
+              </a:defRPr>
+            </a:lvl8pPr>
+            <a:lvl9pPr marL="3886200" indent="-228600" algn="l" defTabSz="914400" rtl="0" eaLnBrk="1" latinLnBrk="1" hangingPunct="1">
+              <a:lnSpc>
+                <a:spcPct val="90000"/>
+              </a:lnSpc>
+              <a:spcBef>
+                <a:spcPts val="500"/>
+              </a:spcBef>
+              <a:buFont typeface="Arial" panose="020B0604020202020204" pitchFamily="34" charset="0"/>
+              <a:buChar char="•"/>
+              <a:defRPr sz="1800" kern="1200">
+                <a:solidFill>
+                  <a:schemeClr val="tx1"/>
+                </a:solidFill>
+                <a:latin typeface="+mn-lt"/>
+                <a:ea typeface="+mn-ea"/>
+                <a:cs typeface="+mn-cs"/>
+              </a:defRPr>
+            </a:lvl9pPr>
+          </a:lstStyle>
+          <a:p>
+            <a:r>
+              <a:rPr lang="en-US" altLang="ko-KR" dirty="0"/>
+              <a:t>config</a:t>
+            </a:r>
+            <a:r>
+              <a:rPr lang="ko-KR" altLang="en-US" dirty="0"/>
+              <a:t> 파일에 </a:t>
+            </a:r>
+            <a:r>
+              <a:rPr lang="en-US" altLang="ko-KR" dirty="0"/>
+              <a:t>resolve</a:t>
+            </a:r>
+            <a:r>
+              <a:rPr lang="ko-KR" altLang="en-US" dirty="0"/>
+              <a:t>를 추가하여 모듈 로딩에 관련된 옵션 사용</a:t>
+            </a:r>
+            <a:endParaRPr lang="en-US" altLang="ko-KR" dirty="0"/>
+          </a:p>
+          <a:p>
+            <a:pPr marL="0" indent="0">
+              <a:buNone/>
+            </a:pPr>
+            <a:r>
+              <a:rPr lang="en-US" altLang="ko-KR" dirty="0"/>
+              <a:t>- alias</a:t>
+            </a:r>
+          </a:p>
+          <a:p>
+            <a:pPr lvl="1"/>
+            <a:r>
+              <a:rPr lang="ko-KR" altLang="en-US" dirty="0"/>
+              <a:t>특정 모듈을 </a:t>
+            </a:r>
+            <a:r>
+              <a:rPr lang="ko-KR" altLang="en-US" dirty="0" err="1"/>
+              <a:t>로딩할</a:t>
+            </a:r>
+            <a:r>
+              <a:rPr lang="ko-KR" altLang="en-US" dirty="0"/>
+              <a:t> 때 </a:t>
+            </a:r>
+            <a:r>
+              <a:rPr lang="en-US" altLang="ko-KR" dirty="0"/>
+              <a:t>alias </a:t>
+            </a:r>
+            <a:r>
+              <a:rPr lang="ko-KR" altLang="en-US" dirty="0"/>
+              <a:t>옵션을 이용하면 별칭으로 더 쉽게 로딩이 가능하다</a:t>
+            </a:r>
+            <a:r>
+              <a:rPr lang="en-US" altLang="ko-KR" dirty="0"/>
+              <a:t>.</a:t>
+            </a:r>
+          </a:p>
+          <a:p>
+            <a:pPr marL="0" indent="0">
+              <a:buNone/>
+            </a:pPr>
+            <a:r>
+              <a:rPr lang="en-US" altLang="ko-KR" dirty="0"/>
+              <a:t>alias: {</a:t>
+            </a:r>
+          </a:p>
+          <a:p>
+            <a:pPr marL="0" indent="0">
+              <a:buNone/>
+            </a:pPr>
+            <a:r>
+              <a:rPr lang="en-US" altLang="ko-KR" dirty="0"/>
+              <a:t>    utilities : </a:t>
+            </a:r>
+            <a:r>
+              <a:rPr lang="en-US" altLang="ko-KR" dirty="0" err="1"/>
+              <a:t>path.resolve</a:t>
+            </a:r>
+            <a:r>
+              <a:rPr lang="en-US" altLang="ko-KR" dirty="0"/>
+              <a:t>(__</a:t>
+            </a:r>
+            <a:r>
+              <a:rPr lang="en-US" altLang="ko-KR" dirty="0" err="1"/>
+              <a:t>dirname</a:t>
+            </a:r>
+            <a:r>
+              <a:rPr lang="en-US" altLang="ko-KR" dirty="0"/>
+              <a:t>, ‘</a:t>
+            </a:r>
+            <a:r>
+              <a:rPr lang="en-US" altLang="ko-KR" dirty="0" err="1"/>
+              <a:t>src</a:t>
+            </a:r>
+            <a:r>
+              <a:rPr lang="en-US" altLang="ko-KR" dirty="0"/>
+              <a:t>/path/utilities/’)</a:t>
+            </a:r>
+          </a:p>
+          <a:p>
+            <a:pPr marL="0" indent="0">
+              <a:buNone/>
+            </a:pPr>
+            <a:r>
+              <a:rPr lang="en-US" altLang="ko-KR" dirty="0"/>
+              <a:t>}</a:t>
+            </a:r>
+          </a:p>
+          <a:p>
+            <a:pPr marL="0" indent="0">
+              <a:buNone/>
+            </a:pPr>
+            <a:r>
+              <a:rPr lang="en-US" altLang="ko-KR" dirty="0"/>
+              <a:t>import utility from ‘</a:t>
+            </a:r>
+            <a:r>
+              <a:rPr lang="en-US" altLang="ko-KR" dirty="0" err="1"/>
+              <a:t>src</a:t>
+            </a:r>
+            <a:r>
+              <a:rPr lang="en-US" altLang="ko-KR" dirty="0"/>
+              <a:t>/path/utilities/utility’;</a:t>
+            </a:r>
+          </a:p>
+          <a:p>
+            <a:pPr marL="0" indent="0">
+              <a:buNone/>
+            </a:pPr>
+            <a:r>
+              <a:rPr lang="en-US" altLang="ko-KR" dirty="0"/>
+              <a:t>// alias </a:t>
+            </a:r>
+            <a:r>
+              <a:rPr lang="ko-KR" altLang="en-US" dirty="0"/>
+              <a:t>사용시</a:t>
+            </a:r>
+            <a:endParaRPr lang="en-US" altLang="ko-KR" dirty="0"/>
+          </a:p>
+          <a:p>
+            <a:pPr marL="0" indent="0">
+              <a:buNone/>
+            </a:pPr>
+            <a:r>
+              <a:rPr lang="en-US" altLang="ko-KR" dirty="0"/>
+              <a:t>import utility from ‘utilities/utility’</a:t>
+            </a:r>
+          </a:p>
+          <a:p>
+            <a:pPr marL="0" indent="0">
+              <a:buNone/>
+            </a:pPr>
+            <a:endParaRPr lang="en-US" altLang="ko-KR" dirty="0"/>
+          </a:p>
+          <a:p>
+            <a:pPr marL="285750" indent="-285750">
+              <a:buFontTx/>
+              <a:buChar char="-"/>
+            </a:pPr>
+            <a:r>
+              <a:rPr lang="en-US" altLang="ko-KR" dirty="0"/>
+              <a:t>modules</a:t>
+            </a:r>
+          </a:p>
+          <a:p>
+            <a:pPr marL="742950" lvl="1" indent="-285750">
+              <a:buFontTx/>
+              <a:buChar char="-"/>
+            </a:pPr>
+            <a:r>
+              <a:rPr lang="en-US" altLang="ko-KR" dirty="0"/>
+              <a:t>require() import ‘’ </a:t>
+            </a:r>
+            <a:r>
+              <a:rPr lang="ko-KR" altLang="en-US" dirty="0"/>
+              <a:t>등의 모듈 로딩시에 어느 폴더를 </a:t>
+            </a:r>
+            <a:r>
+              <a:rPr lang="ko-KR" altLang="en-US" dirty="0" err="1"/>
+              <a:t>기준할</a:t>
+            </a:r>
+            <a:r>
+              <a:rPr lang="ko-KR" altLang="en-US" dirty="0"/>
+              <a:t> 것인지 정하는 옵션</a:t>
+            </a:r>
+            <a:endParaRPr lang="en-US" altLang="ko-KR" dirty="0"/>
+          </a:p>
+          <a:p>
+            <a:pPr marL="742950" lvl="1" indent="-285750">
+              <a:buFontTx/>
+              <a:buChar char="-"/>
+            </a:pPr>
+            <a:r>
+              <a:rPr lang="en-US" altLang="ko-KR" dirty="0"/>
+              <a:t>modules: [‘</a:t>
+            </a:r>
+            <a:r>
+              <a:rPr lang="en-US" altLang="ko-KR" dirty="0" err="1"/>
+              <a:t>node_modules</a:t>
+            </a:r>
+            <a:r>
+              <a:rPr lang="en-US" altLang="ko-KR" dirty="0"/>
+              <a:t>’] // defaults</a:t>
+            </a:r>
+          </a:p>
+          <a:p>
+            <a:pPr marL="742950" lvl="1" indent="-285750">
+              <a:buFontTx/>
+              <a:buChar char="-"/>
+            </a:pPr>
+            <a:r>
+              <a:rPr lang="en-US" altLang="ko-KR" dirty="0"/>
+              <a:t>modules: [</a:t>
+            </a:r>
+            <a:r>
+              <a:rPr lang="en-US" altLang="ko-KR" dirty="0" err="1"/>
+              <a:t>path.resolve</a:t>
+            </a:r>
+            <a:r>
+              <a:rPr lang="en-US" altLang="ko-KR" dirty="0"/>
+              <a:t>(__</a:t>
+            </a:r>
+            <a:r>
+              <a:rPr lang="en-US" altLang="ko-KR" dirty="0" err="1"/>
+              <a:t>dirname</a:t>
+            </a:r>
+            <a:r>
+              <a:rPr lang="en-US" altLang="ko-KR" dirty="0"/>
+              <a:t>, ‘</a:t>
+            </a:r>
+            <a:r>
+              <a:rPr lang="en-US" altLang="ko-KR" dirty="0" err="1"/>
+              <a:t>src</a:t>
+            </a:r>
+            <a:r>
+              <a:rPr lang="en-US" altLang="ko-KR" dirty="0"/>
+              <a:t>’), ‘</a:t>
+            </a:r>
+            <a:r>
+              <a:rPr lang="en-US" altLang="ko-KR" dirty="0" err="1"/>
+              <a:t>node_modules</a:t>
+            </a:r>
+            <a:r>
+              <a:rPr lang="en-US" altLang="ko-KR" dirty="0"/>
+              <a:t>’] // </a:t>
+            </a:r>
+            <a:r>
+              <a:rPr lang="en-US" altLang="ko-KR" dirty="0" err="1"/>
+              <a:t>src</a:t>
+            </a:r>
+            <a:r>
+              <a:rPr lang="en-US" altLang="ko-KR" dirty="0"/>
+              <a:t>/</a:t>
+            </a:r>
+            <a:r>
+              <a:rPr lang="en-US" altLang="ko-KR" dirty="0" err="1"/>
+              <a:t>node_modules</a:t>
+            </a:r>
+            <a:endParaRPr lang="en-US" altLang="ko-KR" dirty="0"/>
+          </a:p>
+        </p:txBody>
+      </p:sp>
+    </p:spTree>
+    <p:extLst>
+      <p:ext uri="{BB962C8B-B14F-4D97-AF65-F5344CB8AC3E}">
+        <p14:creationId xmlns:p14="http://schemas.microsoft.com/office/powerpoint/2010/main" val="36049233"/>
       </p:ext>
     </p:extLst>
   </p:cSld>
@@ -4923,6 +6127,86 @@
     <p:extLst>
       <p:ext uri="{BB962C8B-B14F-4D97-AF65-F5344CB8AC3E}">
         <p14:creationId xmlns:p14="http://schemas.microsoft.com/office/powerpoint/2010/main" val="1620868854"/>
+      </p:ext>
+    </p:extLst>
+  </p:cSld>
+  <p:clrMapOvr>
+    <a:masterClrMapping/>
+  </p:clrMapOvr>
+</p:sld>
+</file>
+
+<file path=ppt/slides/slide20.xml><?xml version="1.0" encoding="utf-8"?>
+<p:sld xmlns:a="http://schemas.openxmlformats.org/drawingml/2006/main" xmlns:r="http://schemas.openxmlformats.org/officeDocument/2006/relationships" xmlns:p="http://schemas.openxmlformats.org/presentationml/2006/main">
+  <p:cSld>
+    <p:spTree>
+      <p:nvGrpSpPr>
+        <p:cNvPr id="1" name=""/>
+        <p:cNvGrpSpPr/>
+        <p:nvPr/>
+      </p:nvGrpSpPr>
+      <p:grpSpPr>
+        <a:xfrm>
+          <a:off x="0" y="0"/>
+          <a:ext cx="0" cy="0"/>
+          <a:chOff x="0" y="0"/>
+          <a:chExt cx="0" cy="0"/>
+        </a:xfrm>
+      </p:grpSpPr>
+      <p:sp>
+        <p:nvSpPr>
+          <p:cNvPr id="2" name="제목 1">
+            <a:extLst>
+              <a:ext uri="{FF2B5EF4-FFF2-40B4-BE49-F238E27FC236}">
+                <a16:creationId xmlns:a16="http://schemas.microsoft.com/office/drawing/2014/main" id="{D90DBF19-1C90-4C89-B63B-83980A575EFF}"/>
+              </a:ext>
+            </a:extLst>
+          </p:cNvPr>
+          <p:cNvSpPr>
+            <a:spLocks noGrp="1"/>
+          </p:cNvSpPr>
+          <p:nvPr>
+            <p:ph type="title"/>
+          </p:nvPr>
+        </p:nvSpPr>
+        <p:spPr/>
+        <p:txBody>
+          <a:bodyPr/>
+          <a:lstStyle/>
+          <a:p>
+            <a:endParaRPr lang="ko-KR" altLang="en-US"/>
+          </a:p>
+        </p:txBody>
+      </p:sp>
+      <p:sp>
+        <p:nvSpPr>
+          <p:cNvPr id="3" name="내용 개체 틀 2">
+            <a:extLst>
+              <a:ext uri="{FF2B5EF4-FFF2-40B4-BE49-F238E27FC236}">
+                <a16:creationId xmlns:a16="http://schemas.microsoft.com/office/drawing/2014/main" id="{C226C01B-B6B0-4781-8E85-B7923288574C}"/>
+              </a:ext>
+            </a:extLst>
+          </p:cNvPr>
+          <p:cNvSpPr>
+            <a:spLocks noGrp="1"/>
+          </p:cNvSpPr>
+          <p:nvPr>
+            <p:ph idx="1"/>
+          </p:nvPr>
+        </p:nvSpPr>
+        <p:spPr/>
+        <p:txBody>
+          <a:bodyPr/>
+          <a:lstStyle/>
+          <a:p>
+            <a:endParaRPr lang="ko-KR" altLang="en-US"/>
+          </a:p>
+        </p:txBody>
+      </p:sp>
+    </p:spTree>
+    <p:extLst>
+      <p:ext uri="{BB962C8B-B14F-4D97-AF65-F5344CB8AC3E}">
+        <p14:creationId xmlns:p14="http://schemas.microsoft.com/office/powerpoint/2010/main" val="1086764026"/>
       </p:ext>
     </p:extLst>
   </p:cSld>

</xml_diff>